<commit_message>
Site updated: 2022-10-23 19:55:03
</commit_message>
<xml_diff>
--- a/papers/BigData.pptx
+++ b/papers/BigData.pptx
@@ -12,7 +12,7 @@
     <p:notesMasterId r:id="rId9"/>
   </p:notesMasterIdLst>
   <p:handoutMasterIdLst>
-    <p:handoutMasterId r:id="rId27"/>
+    <p:handoutMasterId r:id="rId28"/>
   </p:handoutMasterIdLst>
   <p:sldIdLst>
     <p:sldId id="256" r:id="rId7"/>
@@ -34,6 +34,7 @@
     <p:sldId id="398" r:id="rId24"/>
     <p:sldId id="410" r:id="rId25"/>
     <p:sldId id="435" r:id="rId26"/>
+    <p:sldId id="436" r:id="rId27"/>
   </p:sldIdLst>
   <p:sldSz cx="9144000" cy="6858000" type="screen4x3"/>
   <p:notesSz cx="6858000" cy="9144000"/>
@@ -848,6 +849,50 @@
 </file>
 
 <file path=ppt/notesSlides/notesSlide3.xml><?xml version="1.0" encoding="utf-8"?>
+<p:notes xmlns:a="http://schemas.openxmlformats.org/drawingml/2006/main" xmlns:r="http://schemas.openxmlformats.org/officeDocument/2006/relationships" xmlns:p="http://schemas.openxmlformats.org/presentationml/2006/main">
+  <p:cSld>
+    <p:spTree>
+      <p:nvGrpSpPr>
+        <p:cNvPr id="1" name=""/>
+        <p:cNvGrpSpPr/>
+        <p:nvPr/>
+      </p:nvGrpSpPr>
+      <p:grpSpPr/>
+      <p:sp>
+        <p:nvSpPr>
+          <p:cNvPr id="2" name="幻灯片图像占位符 1"/>
+          <p:cNvSpPr/>
+          <p:nvPr>
+            <p:ph type="sldImg" idx="2"/>
+          </p:nvPr>
+        </p:nvSpPr>
+        <p:spPr/>
+      </p:sp>
+      <p:sp>
+        <p:nvSpPr>
+          <p:cNvPr id="3" name="文本占位符 2"/>
+          <p:cNvSpPr/>
+          <p:nvPr>
+            <p:ph type="body" idx="3"/>
+          </p:nvPr>
+        </p:nvSpPr>
+        <p:spPr/>
+        <p:txBody>
+          <a:bodyPr/>
+          <a:p>
+            <a:endParaRPr lang="zh-CN" altLang="en-US"/>
+          </a:p>
+        </p:txBody>
+      </p:sp>
+    </p:spTree>
+  </p:cSld>
+  <p:clrMapOvr>
+    <a:masterClrMapping/>
+  </p:clrMapOvr>
+</p:notes>
+</file>
+
+<file path=ppt/notesSlides/notesSlide4.xml><?xml version="1.0" encoding="utf-8"?>
 <p:notes xmlns:a="http://schemas.openxmlformats.org/drawingml/2006/main" xmlns:r="http://schemas.openxmlformats.org/officeDocument/2006/relationships" xmlns:p="http://schemas.openxmlformats.org/presentationml/2006/main">
   <p:cSld>
     <p:spTree>
@@ -16325,7 +16370,24 @@
               </a:rPr>
               <a:t>Presented by Sun Aihua</a:t>
             </a:r>
-            <a:endParaRPr lang="en-US" altLang="zh-CN"/>
+            <a:endParaRPr lang="en-US" spc="-155" dirty="0">
+              <a:solidFill>
+                <a:srgbClr val="000000"/>
+              </a:solidFill>
+              <a:sym typeface="+mn-ea"/>
+            </a:endParaRPr>
+          </a:p>
+          <a:p>
+            <a:pPr marL="12700" algn="l">
+              <a:lnSpc>
+                <a:spcPct val="150000"/>
+              </a:lnSpc>
+            </a:pPr>
+            <a:r>
+              <a:rPr lang="en-US" altLang="zh-CN" sz="2000"/>
+              <a:t>October 24</a:t>
+            </a:r>
+            <a:endParaRPr lang="en-US" altLang="zh-CN" sz="2000"/>
           </a:p>
         </p:txBody>
       </p:sp>
@@ -18569,14 +18631,6 @@
             <a:pPr algn="just"/>
             <a:r>
               <a:rPr lang="en-US" sz="2800" dirty="0" smtClean="0"/>
-              <a:t>Applied Statistics/Data Analysis</a:t>
-            </a:r>
-            <a:endParaRPr lang="en-US" sz="2800" dirty="0" smtClean="0"/>
-          </a:p>
-          <a:p>
-            <a:pPr algn="just"/>
-            <a:r>
-              <a:rPr lang="en-US" sz="2800" dirty="0" smtClean="0"/>
               <a:t>Solid </a:t>
             </a:r>
             <a:r>
@@ -18622,10 +18676,453 @@
             <a:r>
               <a:rPr lang="en-US" sz="2800" dirty="0" smtClean="0"/>
               <a:t>Machine Learning and discovery</a:t>
+            </a:r>
+            <a:endParaRPr lang="en-US" sz="2800" dirty="0" smtClean="0"/>
+          </a:p>
+          <a:p>
+            <a:pPr algn="just"/>
+            <a:r>
+              <a:rPr lang="en-US" sz="3000" dirty="0">
+                <a:ea typeface="+mn-ea"/>
+              </a:rPr>
+              <a:t>Stay hungry, Stay foolish</a:t>
             </a:r>
             <a:endParaRPr lang="en-US" sz="3000" dirty="0">
               <a:ea typeface="+mn-ea"/>
             </a:endParaRPr>
+          </a:p>
+        </p:txBody>
+      </p:sp>
+      <p:pic>
+        <p:nvPicPr>
+          <p:cNvPr id="2" name="图片 1"/>
+          <p:cNvPicPr>
+            <a:picLocks noChangeAspect="1"/>
+          </p:cNvPicPr>
+          <p:nvPr/>
+        </p:nvPicPr>
+        <p:blipFill>
+          <a:blip r:embed="rId1"/>
+          <a:stretch>
+            <a:fillRect/>
+          </a:stretch>
+        </p:blipFill>
+        <p:spPr>
+          <a:xfrm>
+            <a:off x="2552700" y="5257800"/>
+            <a:ext cx="812800" cy="812800"/>
+          </a:xfrm>
+          <a:prstGeom prst="rect">
+            <a:avLst/>
+          </a:prstGeom>
+        </p:spPr>
+      </p:pic>
+      <p:pic>
+        <p:nvPicPr>
+          <p:cNvPr id="4" name="图片 3"/>
+          <p:cNvPicPr>
+            <a:picLocks noChangeAspect="1"/>
+          </p:cNvPicPr>
+          <p:nvPr/>
+        </p:nvPicPr>
+        <p:blipFill>
+          <a:blip r:embed="rId2"/>
+          <a:stretch>
+            <a:fillRect/>
+          </a:stretch>
+        </p:blipFill>
+        <p:spPr>
+          <a:xfrm>
+            <a:off x="4191000" y="5257800"/>
+            <a:ext cx="812800" cy="812800"/>
+          </a:xfrm>
+          <a:prstGeom prst="rect">
+            <a:avLst/>
+          </a:prstGeom>
+        </p:spPr>
+      </p:pic>
+      <p:pic>
+        <p:nvPicPr>
+          <p:cNvPr id="5" name="图片 4"/>
+          <p:cNvPicPr>
+            <a:picLocks noChangeAspect="1"/>
+          </p:cNvPicPr>
+          <p:nvPr/>
+        </p:nvPicPr>
+        <p:blipFill>
+          <a:blip r:embed="rId3"/>
+          <a:stretch>
+            <a:fillRect/>
+          </a:stretch>
+        </p:blipFill>
+        <p:spPr>
+          <a:xfrm>
+            <a:off x="5829300" y="5181600"/>
+            <a:ext cx="812800" cy="812800"/>
+          </a:xfrm>
+          <a:prstGeom prst="rect">
+            <a:avLst/>
+          </a:prstGeom>
+        </p:spPr>
+      </p:pic>
+      <p:pic>
+        <p:nvPicPr>
+          <p:cNvPr id="6" name="图片 5"/>
+          <p:cNvPicPr>
+            <a:picLocks noChangeAspect="1"/>
+          </p:cNvPicPr>
+          <p:nvPr/>
+        </p:nvPicPr>
+        <p:blipFill>
+          <a:blip r:embed="rId4"/>
+          <a:stretch>
+            <a:fillRect/>
+          </a:stretch>
+        </p:blipFill>
+        <p:spPr>
+          <a:xfrm>
+            <a:off x="7467600" y="5181600"/>
+            <a:ext cx="812800" cy="812800"/>
+          </a:xfrm>
+          <a:prstGeom prst="rect">
+            <a:avLst/>
+          </a:prstGeom>
+        </p:spPr>
+      </p:pic>
+      <p:sp>
+        <p:nvSpPr>
+          <p:cNvPr id="7" name="右箭头 6"/>
+          <p:cNvSpPr/>
+          <p:nvPr/>
+        </p:nvSpPr>
+        <p:spPr>
+          <a:xfrm>
+            <a:off x="3587750" y="5562600"/>
+            <a:ext cx="381000" cy="228600"/>
+          </a:xfrm>
+          <a:prstGeom prst="rightArrow">
+            <a:avLst/>
+          </a:prstGeom>
+          <a:ln>
+            <a:solidFill>
+              <a:schemeClr val="tx1"/>
+            </a:solidFill>
+          </a:ln>
+        </p:spPr>
+        <p:style>
+          <a:lnRef idx="2">
+            <a:schemeClr val="accent6"/>
+          </a:lnRef>
+          <a:fillRef idx="1">
+            <a:schemeClr val="lt1"/>
+          </a:fillRef>
+          <a:effectRef idx="0">
+            <a:schemeClr val="accent6"/>
+          </a:effectRef>
+          <a:fontRef idx="minor">
+            <a:schemeClr val="dk1"/>
+          </a:fontRef>
+        </p:style>
+        <p:txBody>
+          <a:bodyPr rtlCol="0" anchor="ctr"/>
+          <a:p>
+            <a:pPr algn="ctr"/>
+            <a:endParaRPr lang="zh-CN" altLang="en-US"/>
+          </a:p>
+        </p:txBody>
+      </p:sp>
+      <p:sp>
+        <p:nvSpPr>
+          <p:cNvPr id="9" name="右箭头 8"/>
+          <p:cNvSpPr/>
+          <p:nvPr/>
+        </p:nvSpPr>
+        <p:spPr>
+          <a:xfrm>
+            <a:off x="6864350" y="5562600"/>
+            <a:ext cx="381000" cy="228600"/>
+          </a:xfrm>
+          <a:prstGeom prst="rightArrow">
+            <a:avLst/>
+          </a:prstGeom>
+          <a:ln>
+            <a:solidFill>
+              <a:schemeClr val="tx1"/>
+            </a:solidFill>
+          </a:ln>
+        </p:spPr>
+        <p:style>
+          <a:lnRef idx="2">
+            <a:schemeClr val="accent6"/>
+          </a:lnRef>
+          <a:fillRef idx="1">
+            <a:schemeClr val="lt1"/>
+          </a:fillRef>
+          <a:effectRef idx="0">
+            <a:schemeClr val="accent6"/>
+          </a:effectRef>
+          <a:fontRef idx="minor">
+            <a:schemeClr val="dk1"/>
+          </a:fontRef>
+        </p:style>
+        <p:txBody>
+          <a:bodyPr rtlCol="0" anchor="ctr"/>
+          <a:p>
+            <a:pPr algn="ctr"/>
+            <a:endParaRPr lang="zh-CN" altLang="en-US"/>
+          </a:p>
+        </p:txBody>
+      </p:sp>
+      <p:sp>
+        <p:nvSpPr>
+          <p:cNvPr id="11" name="文本框 10"/>
+          <p:cNvSpPr txBox="1"/>
+          <p:nvPr/>
+        </p:nvSpPr>
+        <p:spPr>
+          <a:xfrm>
+            <a:off x="868045" y="6096000"/>
+            <a:ext cx="904875" cy="368300"/>
+          </a:xfrm>
+          <a:prstGeom prst="rect">
+            <a:avLst/>
+          </a:prstGeom>
+          <a:noFill/>
+        </p:spPr>
+        <p:txBody>
+          <a:bodyPr wrap="square" rtlCol="0" anchor="t">
+            <a:spAutoFit/>
+          </a:bodyPr>
+          <a:p>
+            <a:r>
+              <a:rPr lang="zh-CN" altLang="en-US"/>
+              <a:t>Novice</a:t>
+            </a:r>
+            <a:endParaRPr lang="zh-CN" altLang="en-US"/>
+          </a:p>
+        </p:txBody>
+      </p:sp>
+      <p:sp>
+        <p:nvSpPr>
+          <p:cNvPr id="12" name="文本框 11"/>
+          <p:cNvSpPr txBox="1"/>
+          <p:nvPr/>
+        </p:nvSpPr>
+        <p:spPr>
+          <a:xfrm>
+            <a:off x="2336800" y="6096000"/>
+            <a:ext cx="1320800" cy="368300"/>
+          </a:xfrm>
+          <a:prstGeom prst="rect">
+            <a:avLst/>
+          </a:prstGeom>
+          <a:noFill/>
+        </p:spPr>
+        <p:txBody>
+          <a:bodyPr wrap="square" rtlCol="0" anchor="t">
+            <a:spAutoFit/>
+          </a:bodyPr>
+          <a:p>
+            <a:r>
+              <a:rPr lang="zh-CN" altLang="en-US"/>
+              <a:t>Contributor</a:t>
+            </a:r>
+            <a:endParaRPr lang="zh-CN" altLang="en-US"/>
+          </a:p>
+        </p:txBody>
+      </p:sp>
+      <p:sp>
+        <p:nvSpPr>
+          <p:cNvPr id="13" name="文本框 12"/>
+          <p:cNvSpPr txBox="1"/>
+          <p:nvPr/>
+        </p:nvSpPr>
+        <p:spPr>
+          <a:xfrm>
+            <a:off x="4191000" y="6096000"/>
+            <a:ext cx="904875" cy="368300"/>
+          </a:xfrm>
+          <a:prstGeom prst="rect">
+            <a:avLst/>
+          </a:prstGeom>
+          <a:noFill/>
+        </p:spPr>
+        <p:txBody>
+          <a:bodyPr wrap="square" rtlCol="0" anchor="t">
+            <a:spAutoFit/>
+          </a:bodyPr>
+          <a:p>
+            <a:r>
+              <a:rPr lang="zh-CN" altLang="en-US"/>
+              <a:t>Expert</a:t>
+            </a:r>
+            <a:endParaRPr lang="zh-CN" altLang="en-US"/>
+          </a:p>
+        </p:txBody>
+      </p:sp>
+      <p:sp>
+        <p:nvSpPr>
+          <p:cNvPr id="14" name="文本框 13"/>
+          <p:cNvSpPr txBox="1"/>
+          <p:nvPr/>
+        </p:nvSpPr>
+        <p:spPr>
+          <a:xfrm>
+            <a:off x="5821680" y="6096000"/>
+            <a:ext cx="904875" cy="368300"/>
+          </a:xfrm>
+          <a:prstGeom prst="rect">
+            <a:avLst/>
+          </a:prstGeom>
+          <a:noFill/>
+        </p:spPr>
+        <p:txBody>
+          <a:bodyPr wrap="square" rtlCol="0" anchor="t">
+            <a:spAutoFit/>
+          </a:bodyPr>
+          <a:p>
+            <a:r>
+              <a:rPr lang="zh-CN" altLang="en-US"/>
+              <a:t>Master</a:t>
+            </a:r>
+            <a:endParaRPr lang="zh-CN" altLang="en-US"/>
+          </a:p>
+        </p:txBody>
+      </p:sp>
+      <p:sp>
+        <p:nvSpPr>
+          <p:cNvPr id="16" name="右箭头 15"/>
+          <p:cNvSpPr/>
+          <p:nvPr/>
+        </p:nvSpPr>
+        <p:spPr>
+          <a:xfrm>
+            <a:off x="5226050" y="5562600"/>
+            <a:ext cx="381000" cy="228600"/>
+          </a:xfrm>
+          <a:prstGeom prst="rightArrow">
+            <a:avLst/>
+          </a:prstGeom>
+          <a:ln>
+            <a:solidFill>
+              <a:schemeClr val="tx1"/>
+            </a:solidFill>
+          </a:ln>
+        </p:spPr>
+        <p:style>
+          <a:lnRef idx="2">
+            <a:schemeClr val="accent6"/>
+          </a:lnRef>
+          <a:fillRef idx="1">
+            <a:schemeClr val="lt1"/>
+          </a:fillRef>
+          <a:effectRef idx="0">
+            <a:schemeClr val="accent6"/>
+          </a:effectRef>
+          <a:fontRef idx="minor">
+            <a:schemeClr val="dk1"/>
+          </a:fontRef>
+        </p:style>
+        <p:txBody>
+          <a:bodyPr rtlCol="0" anchor="ctr"/>
+          <a:p>
+            <a:pPr algn="ctr"/>
+            <a:endParaRPr lang="zh-CN" altLang="en-US"/>
+          </a:p>
+        </p:txBody>
+      </p:sp>
+      <p:pic>
+        <p:nvPicPr>
+          <p:cNvPr id="17" name="图片 16"/>
+          <p:cNvPicPr>
+            <a:picLocks noChangeAspect="1"/>
+          </p:cNvPicPr>
+          <p:nvPr/>
+        </p:nvPicPr>
+        <p:blipFill>
+          <a:blip r:embed="rId5"/>
+          <a:stretch>
+            <a:fillRect/>
+          </a:stretch>
+        </p:blipFill>
+        <p:spPr>
+          <a:xfrm>
+            <a:off x="914400" y="5270500"/>
+            <a:ext cx="812800" cy="812800"/>
+          </a:xfrm>
+          <a:prstGeom prst="rect">
+            <a:avLst/>
+          </a:prstGeom>
+        </p:spPr>
+      </p:pic>
+      <p:sp>
+        <p:nvSpPr>
+          <p:cNvPr id="18" name="右箭头 17"/>
+          <p:cNvSpPr/>
+          <p:nvPr/>
+        </p:nvSpPr>
+        <p:spPr>
+          <a:xfrm>
+            <a:off x="1949450" y="5549900"/>
+            <a:ext cx="381000" cy="228600"/>
+          </a:xfrm>
+          <a:prstGeom prst="rightArrow">
+            <a:avLst/>
+          </a:prstGeom>
+          <a:ln>
+            <a:solidFill>
+              <a:schemeClr val="tx1"/>
+            </a:solidFill>
+          </a:ln>
+        </p:spPr>
+        <p:style>
+          <a:lnRef idx="2">
+            <a:schemeClr val="accent6"/>
+          </a:lnRef>
+          <a:fillRef idx="1">
+            <a:schemeClr val="lt1"/>
+          </a:fillRef>
+          <a:effectRef idx="0">
+            <a:schemeClr val="accent6"/>
+          </a:effectRef>
+          <a:fontRef idx="minor">
+            <a:schemeClr val="dk1"/>
+          </a:fontRef>
+        </p:style>
+        <p:txBody>
+          <a:bodyPr rtlCol="0" anchor="ctr"/>
+          <a:p>
+            <a:pPr algn="ctr"/>
+            <a:endParaRPr lang="zh-CN" altLang="en-US"/>
+          </a:p>
+        </p:txBody>
+      </p:sp>
+      <p:sp>
+        <p:nvSpPr>
+          <p:cNvPr id="19" name="文本框 18"/>
+          <p:cNvSpPr txBox="1"/>
+          <p:nvPr/>
+        </p:nvSpPr>
+        <p:spPr>
+          <a:xfrm>
+            <a:off x="7167880" y="6070600"/>
+            <a:ext cx="1612900" cy="368300"/>
+          </a:xfrm>
+          <a:prstGeom prst="rect">
+            <a:avLst/>
+          </a:prstGeom>
+          <a:noFill/>
+        </p:spPr>
+        <p:txBody>
+          <a:bodyPr wrap="square" rtlCol="0" anchor="t">
+            <a:spAutoFit/>
+          </a:bodyPr>
+          <a:p>
+            <a:r>
+              <a:rPr lang="zh-CN" altLang="en-US"/>
+              <a:t>Grandmaster</a:t>
+            </a:r>
+            <a:endParaRPr lang="zh-CN" altLang="en-US"/>
           </a:p>
         </p:txBody>
       </p:sp>
@@ -18930,6 +19427,82 @@
 </p:sld>
 </file>
 
+<file path=ppt/slides/slide20.xml><?xml version="1.0" encoding="utf-8"?>
+<p:sld xmlns:a="http://schemas.openxmlformats.org/drawingml/2006/main" xmlns:r="http://schemas.openxmlformats.org/officeDocument/2006/relationships" xmlns:p="http://schemas.openxmlformats.org/presentationml/2006/main">
+  <p:cSld>
+    <p:spTree>
+      <p:nvGrpSpPr>
+        <p:cNvPr id="1" name=""/>
+        <p:cNvGrpSpPr/>
+        <p:nvPr/>
+      </p:nvGrpSpPr>
+      <p:grpSpPr/>
+      <p:pic>
+        <p:nvPicPr>
+          <p:cNvPr id="4" name="图片 3"/>
+          <p:cNvPicPr>
+            <a:picLocks noChangeAspect="1"/>
+          </p:cNvPicPr>
+          <p:nvPr/>
+        </p:nvPicPr>
+        <p:blipFill>
+          <a:blip r:embed="rId1">
+            <a:alphaModFix amt="56000"/>
+          </a:blip>
+          <a:stretch>
+            <a:fillRect/>
+          </a:stretch>
+        </p:blipFill>
+        <p:spPr>
+          <a:xfrm>
+            <a:off x="76200" y="609600"/>
+            <a:ext cx="9020175" cy="6008370"/>
+          </a:xfrm>
+          <a:prstGeom prst="rect">
+            <a:avLst/>
+          </a:prstGeom>
+        </p:spPr>
+      </p:pic>
+      <p:sp>
+        <p:nvSpPr>
+          <p:cNvPr id="9218" name="Rectangle 2"/>
+          <p:cNvSpPr>
+            <a:spLocks noGrp="1" noChangeArrowheads="1"/>
+          </p:cNvSpPr>
+          <p:nvPr>
+            <p:ph type="ctrTitle"/>
+          </p:nvPr>
+        </p:nvSpPr>
+        <p:spPr>
+          <a:xfrm>
+            <a:off x="351790" y="838200"/>
+            <a:ext cx="8440420" cy="3368040"/>
+          </a:xfrm>
+        </p:spPr>
+        <p:txBody>
+          <a:bodyPr/>
+          <a:p>
+            <a:pPr algn="ctr" eaLnBrk="1" hangingPunct="1"/>
+            <a:r>
+              <a:rPr lang="en-US" altLang="en-US" sz="4400" dirty="0" smtClean="0">
+                <a:ea typeface="ＭＳ Ｐゴシック" panose="020B0600070205080204" pitchFamily="34" charset="-128"/>
+              </a:rPr>
+              <a:t>Happy China Programmer’s Day!</a:t>
+            </a:r>
+            <a:endParaRPr lang="en-US" altLang="en-US" sz="4400" dirty="0" smtClean="0">
+              <a:ea typeface="ＭＳ Ｐゴシック" panose="020B0600070205080204" pitchFamily="34" charset="-128"/>
+            </a:endParaRPr>
+          </a:p>
+        </p:txBody>
+      </p:sp>
+    </p:spTree>
+  </p:cSld>
+  <p:clrMapOvr>
+    <a:masterClrMapping/>
+  </p:clrMapOvr>
+</p:sld>
+</file>
+
 <file path=ppt/slides/slide3.xml><?xml version="1.0" encoding="utf-8"?>
 <p:sld xmlns:a="http://schemas.openxmlformats.org/drawingml/2006/main" xmlns:r="http://schemas.openxmlformats.org/officeDocument/2006/relationships" xmlns:p="http://schemas.openxmlformats.org/presentationml/2006/main">
   <p:cSld>
@@ -19048,13 +19621,7 @@
           <p:nvPr/>
         </p:nvPicPr>
         <p:blipFill>
-          <a:blip r:embed="rId1" cstate="print">
-            <a:extLst>
-              <a:ext uri="{28A0092B-C50C-407E-A947-70E740481C1C}">
-                <a14:useLocalDpi xmlns:a14="http://schemas.microsoft.com/office/drawing/2010/main" val="0"/>
-              </a:ext>
-            </a:extLst>
-          </a:blip>
+          <a:blip r:embed="rId1"/>
           <a:stretch>
             <a:fillRect/>
           </a:stretch>
@@ -19078,13 +19645,7 @@
           <p:nvPr/>
         </p:nvPicPr>
         <p:blipFill>
-          <a:blip r:embed="rId2">
-            <a:extLst>
-              <a:ext uri="{28A0092B-C50C-407E-A947-70E740481C1C}">
-                <a14:useLocalDpi xmlns:a14="http://schemas.microsoft.com/office/drawing/2010/main" val="0"/>
-              </a:ext>
-            </a:extLst>
-          </a:blip>
+          <a:blip r:embed="rId2"/>
           <a:stretch>
             <a:fillRect/>
           </a:stretch>
@@ -19138,13 +19699,7 @@
           <p:nvPr/>
         </p:nvPicPr>
         <p:blipFill>
-          <a:blip r:embed="rId4" cstate="print">
-            <a:extLst>
-              <a:ext uri="{28A0092B-C50C-407E-A947-70E740481C1C}">
-                <a14:useLocalDpi xmlns:a14="http://schemas.microsoft.com/office/drawing/2010/main" val="0"/>
-              </a:ext>
-            </a:extLst>
-          </a:blip>
+          <a:blip r:embed="rId4"/>
           <a:stretch>
             <a:fillRect/>
           </a:stretch>
@@ -19810,6 +20365,16 @@
             <a:r>
               <a:rPr lang="en-US" dirty="0"/>
               <a:t>and OLAP</a:t>
+            </a:r>
+            <a:endParaRPr lang="en-US" dirty="0"/>
+          </a:p>
+          <a:p>
+            <a:pPr marL="457200" lvl="1" indent="0">
+              <a:buNone/>
+            </a:pPr>
+            <a:r>
+              <a:rPr lang="en-US" dirty="0"/>
+              <a:t>(On Line Analytical Processing)</a:t>
             </a:r>
             <a:endParaRPr lang="en-US" dirty="0"/>
           </a:p>

</xml_diff>